<commit_message>
Address comments on thesis presentation
</commit_message>
<xml_diff>
--- a/Presentations/Thesis Presentation.pptx
+++ b/Presentations/Thesis Presentation.pptx
@@ -8917,7 +8917,7 @@
         </p:nvSpPr>
         <p:spPr>
           <a:xfrm>
-            <a:off x="609599" y="999068"/>
+            <a:off x="437091" y="947595"/>
             <a:ext cx="2175933" cy="1169551"/>
           </a:xfrm>
           <a:prstGeom prst="rect">
@@ -8952,7 +8952,7 @@
         </p:nvSpPr>
         <p:spPr>
           <a:xfrm>
-            <a:off x="4150608" y="1097454"/>
+            <a:off x="3106562" y="906216"/>
             <a:ext cx="2760133" cy="954107"/>
           </a:xfrm>
           <a:prstGeom prst="rect">
@@ -9124,7 +9124,7 @@
         <p:spPr>
           <a:xfrm>
             <a:off x="5515683" y="2592808"/>
-            <a:ext cx="3202517" cy="1600438"/>
+            <a:ext cx="3202517" cy="954107"/>
           </a:xfrm>
           <a:prstGeom prst="rect">
             <a:avLst/>
@@ -9151,7 +9151,42 @@
             </a:r>
             <a:r>
               <a:rPr lang="en-US" dirty="0"/>
-              <a:t>models to aid in the characterization of PDRC behavior throughout the day, providing a benchmark for experimental testing on rooftop installations.</a:t>
+              <a:t>models to aid in the characterization of PDRC behavior throughout the day.</a:t>
+            </a:r>
+          </a:p>
+        </p:txBody>
+      </p:sp>
+      <p:sp>
+        <p:nvSpPr>
+          <p:cNvPr id="3" name="TextBox 2">
+            <a:extLst>
+              <a:ext uri="{FF2B5EF4-FFF2-40B4-BE49-F238E27FC236}">
+                <a16:creationId xmlns:a16="http://schemas.microsoft.com/office/drawing/2014/main" id="{E057E79F-C1E5-5596-404B-2E1C53E297F3}"/>
+              </a:ext>
+            </a:extLst>
+          </p:cNvPr>
+          <p:cNvSpPr txBox="1"/>
+          <p:nvPr/>
+        </p:nvSpPr>
+        <p:spPr>
+          <a:xfrm>
+            <a:off x="5958067" y="906216"/>
+            <a:ext cx="2760133" cy="954107"/>
+          </a:xfrm>
+          <a:prstGeom prst="rect">
+            <a:avLst/>
+          </a:prstGeom>
+          <a:noFill/>
+        </p:spPr>
+        <p:txBody>
+          <a:bodyPr wrap="square" rtlCol="0">
+            <a:spAutoFit/>
+          </a:bodyPr>
+          <a:lstStyle/>
+          <a:p>
+            <a:r>
+              <a:rPr lang="en-US" dirty="0"/>
+              <a:t>Successfully modeled (anti)-reflectance coating, (multi)-layer high-reflectance coatings, Fresnel equations etc.</a:t>
             </a:r>
           </a:p>
         </p:txBody>
@@ -9325,13 +9360,13 @@
           <p:nvPr>
             <p:extLst>
               <p:ext uri="{D42A27DB-BD31-4B8C-83A1-F6EECF244321}">
-                <p14:modId xmlns:p14="http://schemas.microsoft.com/office/powerpoint/2010/main" val="1039556649"/>
+                <p14:modId xmlns:p14="http://schemas.microsoft.com/office/powerpoint/2010/main" val="3508400295"/>
               </p:ext>
             </p:extLst>
           </p:nvPr>
         </p:nvGraphicFramePr>
         <p:xfrm>
-          <a:off x="0" y="905645"/>
+          <a:off x="177281" y="931022"/>
           <a:ext cx="3081867" cy="2385411"/>
         </p:xfrm>
         <a:graphic>
@@ -9354,7 +9389,7 @@
         </p:nvSpPr>
         <p:spPr>
           <a:xfrm>
-            <a:off x="350583" y="3863389"/>
+            <a:off x="237861" y="3879690"/>
             <a:ext cx="4334139" cy="715581"/>
           </a:xfrm>
           <a:prstGeom prst="rect">
@@ -9500,6 +9535,36 @@
           <a:chExt cx="0" cy="0"/>
         </a:xfrm>
       </p:grpSpPr>
+      <p:pic>
+        <p:nvPicPr>
+          <p:cNvPr id="10" name="Picture 9" descr="A graph of a window&#10;&#10;Description automatically generated">
+            <a:extLst>
+              <a:ext uri="{FF2B5EF4-FFF2-40B4-BE49-F238E27FC236}">
+                <a16:creationId xmlns:a16="http://schemas.microsoft.com/office/drawing/2014/main" id="{68F59577-90EB-11D2-8DE3-4592DDE533EE}"/>
+              </a:ext>
+            </a:extLst>
+          </p:cNvPr>
+          <p:cNvPicPr>
+            <a:picLocks noChangeAspect="1"/>
+          </p:cNvPicPr>
+          <p:nvPr/>
+        </p:nvPicPr>
+        <p:blipFill>
+          <a:blip r:embed="rId3"/>
+          <a:stretch>
+            <a:fillRect/>
+          </a:stretch>
+        </p:blipFill>
+        <p:spPr>
+          <a:xfrm>
+            <a:off x="406266" y="1603539"/>
+            <a:ext cx="4700633" cy="1946727"/>
+          </a:xfrm>
+          <a:prstGeom prst="rect">
+            <a:avLst/>
+          </a:prstGeom>
+        </p:spPr>
+      </p:pic>
       <p:sp>
         <p:nvSpPr>
           <p:cNvPr id="2" name="Title 1">
@@ -9548,7 +9613,7 @@
           <p:nvPr/>
         </p:nvPicPr>
         <p:blipFill>
-          <a:blip r:embed="rId3"/>
+          <a:blip r:embed="rId4"/>
           <a:stretch>
             <a:fillRect/>
           </a:stretch>
@@ -9557,36 +9622,6 @@
           <a:xfrm>
             <a:off x="5811457" y="498784"/>
             <a:ext cx="2878550" cy="2118933"/>
-          </a:xfrm>
-          <a:prstGeom prst="rect">
-            <a:avLst/>
-          </a:prstGeom>
-        </p:spPr>
-      </p:pic>
-      <p:pic>
-        <p:nvPicPr>
-          <p:cNvPr id="13" name="Picture 12" descr="A graph showing the length of a window&#10;&#10;Description automatically generated">
-            <a:extLst>
-              <a:ext uri="{FF2B5EF4-FFF2-40B4-BE49-F238E27FC236}">
-                <a16:creationId xmlns:a16="http://schemas.microsoft.com/office/drawing/2014/main" id="{DA7A8998-51B4-B16E-9919-DBBD4E4C136B}"/>
-              </a:ext>
-            </a:extLst>
-          </p:cNvPr>
-          <p:cNvPicPr>
-            <a:picLocks noChangeAspect="1"/>
-          </p:cNvPicPr>
-          <p:nvPr/>
-        </p:nvPicPr>
-        <p:blipFill>
-          <a:blip r:embed="rId4"/>
-          <a:stretch>
-            <a:fillRect/>
-          </a:stretch>
-        </p:blipFill>
-        <p:spPr>
-          <a:xfrm>
-            <a:off x="453993" y="1651707"/>
-            <a:ext cx="4560715" cy="1888781"/>
           </a:xfrm>
           <a:prstGeom prst="rect">
             <a:avLst/>
@@ -9658,8 +9693,8 @@
         </p:nvSpPr>
         <p:spPr>
           <a:xfrm>
-            <a:off x="944110" y="1729831"/>
-            <a:ext cx="1161146" cy="1642880"/>
+            <a:off x="881929" y="1651708"/>
+            <a:ext cx="989916" cy="1642880"/>
           </a:xfrm>
           <a:prstGeom prst="rect">
             <a:avLst/>
@@ -9885,7 +9920,7 @@
         </p:nvSpPr>
         <p:spPr>
           <a:xfrm>
-            <a:off x="744157" y="3428696"/>
+            <a:off x="744157" y="3485285"/>
             <a:ext cx="5067300" cy="184666"/>
           </a:xfrm>
           <a:prstGeom prst="rect">
@@ -10110,6 +10145,423 @@
   <p:clrMapOvr>
     <a:masterClrMapping/>
   </p:clrMapOvr>
+  <p:timing>
+    <p:tnLst>
+      <p:par>
+        <p:cTn id="1" dur="indefinite" restart="never" nodeType="tmRoot">
+          <p:childTnLst>
+            <p:seq concurrent="1" nextAc="seek">
+              <p:cTn id="2" dur="indefinite" nodeType="mainSeq">
+                <p:childTnLst>
+                  <p:par>
+                    <p:cTn id="3" fill="hold">
+                      <p:stCondLst>
+                        <p:cond delay="indefinite"/>
+                      </p:stCondLst>
+                      <p:childTnLst>
+                        <p:par>
+                          <p:cTn id="4" fill="hold">
+                            <p:stCondLst>
+                              <p:cond delay="0"/>
+                            </p:stCondLst>
+                            <p:childTnLst>
+                              <p:par>
+                                <p:cTn id="5" presetID="1" presetClass="entr" presetSubtype="0" fill="hold" nodeType="clickEffect">
+                                  <p:stCondLst>
+                                    <p:cond delay="0"/>
+                                  </p:stCondLst>
+                                  <p:childTnLst>
+                                    <p:set>
+                                      <p:cBhvr>
+                                        <p:cTn id="6" dur="1" fill="hold">
+                                          <p:stCondLst>
+                                            <p:cond delay="0"/>
+                                          </p:stCondLst>
+                                        </p:cTn>
+                                        <p:tgtEl>
+                                          <p:spTgt spid="10"/>
+                                        </p:tgtEl>
+                                        <p:attrNameLst>
+                                          <p:attrName>style.visibility</p:attrName>
+                                        </p:attrNameLst>
+                                      </p:cBhvr>
+                                      <p:to>
+                                        <p:strVal val="visible"/>
+                                      </p:to>
+                                    </p:set>
+                                  </p:childTnLst>
+                                </p:cTn>
+                              </p:par>
+                              <p:par>
+                                <p:cTn id="7" presetID="1" presetClass="entr" presetSubtype="0" fill="hold" grpId="0" nodeType="withEffect">
+                                  <p:stCondLst>
+                                    <p:cond delay="0"/>
+                                  </p:stCondLst>
+                                  <p:childTnLst>
+                                    <p:set>
+                                      <p:cBhvr>
+                                        <p:cTn id="8" dur="1" fill="hold">
+                                          <p:stCondLst>
+                                            <p:cond delay="0"/>
+                                          </p:stCondLst>
+                                        </p:cTn>
+                                        <p:tgtEl>
+                                          <p:spTgt spid="6"/>
+                                        </p:tgtEl>
+                                        <p:attrNameLst>
+                                          <p:attrName>style.visibility</p:attrName>
+                                        </p:attrNameLst>
+                                      </p:cBhvr>
+                                      <p:to>
+                                        <p:strVal val="visible"/>
+                                      </p:to>
+                                    </p:set>
+                                  </p:childTnLst>
+                                </p:cTn>
+                              </p:par>
+                            </p:childTnLst>
+                          </p:cTn>
+                        </p:par>
+                      </p:childTnLst>
+                    </p:cTn>
+                  </p:par>
+                  <p:par>
+                    <p:cTn id="9" fill="hold">
+                      <p:stCondLst>
+                        <p:cond delay="indefinite"/>
+                      </p:stCondLst>
+                      <p:childTnLst>
+                        <p:par>
+                          <p:cTn id="10" fill="hold">
+                            <p:stCondLst>
+                              <p:cond delay="0"/>
+                            </p:stCondLst>
+                            <p:childTnLst>
+                              <p:par>
+                                <p:cTn id="11" presetID="1" presetClass="entr" presetSubtype="0" fill="hold" grpId="0" nodeType="clickEffect">
+                                  <p:stCondLst>
+                                    <p:cond delay="0"/>
+                                  </p:stCondLst>
+                                  <p:childTnLst>
+                                    <p:set>
+                                      <p:cBhvr>
+                                        <p:cTn id="12" dur="1" fill="hold">
+                                          <p:stCondLst>
+                                            <p:cond delay="0"/>
+                                          </p:stCondLst>
+                                        </p:cTn>
+                                        <p:tgtEl>
+                                          <p:spTgt spid="4"/>
+                                        </p:tgtEl>
+                                        <p:attrNameLst>
+                                          <p:attrName>style.visibility</p:attrName>
+                                        </p:attrNameLst>
+                                      </p:cBhvr>
+                                      <p:to>
+                                        <p:strVal val="visible"/>
+                                      </p:to>
+                                    </p:set>
+                                  </p:childTnLst>
+                                </p:cTn>
+                              </p:par>
+                              <p:par>
+                                <p:cTn id="13" presetID="1" presetClass="entr" presetSubtype="0" fill="hold" nodeType="withEffect">
+                                  <p:stCondLst>
+                                    <p:cond delay="0"/>
+                                  </p:stCondLst>
+                                  <p:childTnLst>
+                                    <p:set>
+                                      <p:cBhvr>
+                                        <p:cTn id="14" dur="1" fill="hold">
+                                          <p:stCondLst>
+                                            <p:cond delay="0"/>
+                                          </p:stCondLst>
+                                        </p:cTn>
+                                        <p:tgtEl>
+                                          <p:spTgt spid="25"/>
+                                        </p:tgtEl>
+                                        <p:attrNameLst>
+                                          <p:attrName>style.visibility</p:attrName>
+                                        </p:attrNameLst>
+                                      </p:cBhvr>
+                                      <p:to>
+                                        <p:strVal val="visible"/>
+                                      </p:to>
+                                    </p:set>
+                                  </p:childTnLst>
+                                </p:cTn>
+                              </p:par>
+                              <p:par>
+                                <p:cTn id="15" presetID="1" presetClass="entr" presetSubtype="0" fill="hold" grpId="0" nodeType="withEffect">
+                                  <p:stCondLst>
+                                    <p:cond delay="0"/>
+                                  </p:stCondLst>
+                                  <p:childTnLst>
+                                    <p:set>
+                                      <p:cBhvr>
+                                        <p:cTn id="16" dur="1" fill="hold">
+                                          <p:stCondLst>
+                                            <p:cond delay="0"/>
+                                          </p:stCondLst>
+                                        </p:cTn>
+                                        <p:tgtEl>
+                                          <p:spTgt spid="24"/>
+                                        </p:tgtEl>
+                                        <p:attrNameLst>
+                                          <p:attrName>style.visibility</p:attrName>
+                                        </p:attrNameLst>
+                                      </p:cBhvr>
+                                      <p:to>
+                                        <p:strVal val="visible"/>
+                                      </p:to>
+                                    </p:set>
+                                  </p:childTnLst>
+                                </p:cTn>
+                              </p:par>
+                              <p:par>
+                                <p:cTn id="17" presetID="1" presetClass="entr" presetSubtype="0" fill="hold" nodeType="withEffect">
+                                  <p:stCondLst>
+                                    <p:cond delay="0"/>
+                                  </p:stCondLst>
+                                  <p:childTnLst>
+                                    <p:set>
+                                      <p:cBhvr>
+                                        <p:cTn id="18" dur="1" fill="hold">
+                                          <p:stCondLst>
+                                            <p:cond delay="0"/>
+                                          </p:stCondLst>
+                                        </p:cTn>
+                                        <p:tgtEl>
+                                          <p:spTgt spid="29"/>
+                                        </p:tgtEl>
+                                        <p:attrNameLst>
+                                          <p:attrName>style.visibility</p:attrName>
+                                        </p:attrNameLst>
+                                      </p:cBhvr>
+                                      <p:to>
+                                        <p:strVal val="visible"/>
+                                      </p:to>
+                                    </p:set>
+                                  </p:childTnLst>
+                                </p:cTn>
+                              </p:par>
+                              <p:par>
+                                <p:cTn id="19" presetID="1" presetClass="entr" presetSubtype="0" fill="hold" grpId="0" nodeType="withEffect">
+                                  <p:stCondLst>
+                                    <p:cond delay="0"/>
+                                  </p:stCondLst>
+                                  <p:childTnLst>
+                                    <p:set>
+                                      <p:cBhvr>
+                                        <p:cTn id="20" dur="1" fill="hold">
+                                          <p:stCondLst>
+                                            <p:cond delay="0"/>
+                                          </p:stCondLst>
+                                        </p:cTn>
+                                        <p:tgtEl>
+                                          <p:spTgt spid="9"/>
+                                        </p:tgtEl>
+                                        <p:attrNameLst>
+                                          <p:attrName>style.visibility</p:attrName>
+                                        </p:attrNameLst>
+                                      </p:cBhvr>
+                                      <p:to>
+                                        <p:strVal val="visible"/>
+                                      </p:to>
+                                    </p:set>
+                                  </p:childTnLst>
+                                </p:cTn>
+                              </p:par>
+                            </p:childTnLst>
+                          </p:cTn>
+                        </p:par>
+                      </p:childTnLst>
+                    </p:cTn>
+                  </p:par>
+                  <p:par>
+                    <p:cTn id="21" fill="hold">
+                      <p:stCondLst>
+                        <p:cond delay="indefinite"/>
+                      </p:stCondLst>
+                      <p:childTnLst>
+                        <p:par>
+                          <p:cTn id="22" fill="hold">
+                            <p:stCondLst>
+                              <p:cond delay="0"/>
+                            </p:stCondLst>
+                            <p:childTnLst>
+                              <p:par>
+                                <p:cTn id="23" presetID="1" presetClass="entr" presetSubtype="0" fill="hold" grpId="0" nodeType="clickEffect">
+                                  <p:stCondLst>
+                                    <p:cond delay="0"/>
+                                  </p:stCondLst>
+                                  <p:childTnLst>
+                                    <p:set>
+                                      <p:cBhvr>
+                                        <p:cTn id="24" dur="1" fill="hold">
+                                          <p:stCondLst>
+                                            <p:cond delay="0"/>
+                                          </p:stCondLst>
+                                        </p:cTn>
+                                        <p:tgtEl>
+                                          <p:spTgt spid="3"/>
+                                        </p:tgtEl>
+                                        <p:attrNameLst>
+                                          <p:attrName>style.visibility</p:attrName>
+                                        </p:attrNameLst>
+                                      </p:cBhvr>
+                                      <p:to>
+                                        <p:strVal val="visible"/>
+                                      </p:to>
+                                    </p:set>
+                                  </p:childTnLst>
+                                </p:cTn>
+                              </p:par>
+                              <p:par>
+                                <p:cTn id="25" presetID="1" presetClass="entr" presetSubtype="0" fill="hold" nodeType="withEffect">
+                                  <p:stCondLst>
+                                    <p:cond delay="0"/>
+                                  </p:stCondLst>
+                                  <p:childTnLst>
+                                    <p:set>
+                                      <p:cBhvr>
+                                        <p:cTn id="26" dur="1" fill="hold">
+                                          <p:stCondLst>
+                                            <p:cond delay="0"/>
+                                          </p:stCondLst>
+                                        </p:cTn>
+                                        <p:tgtEl>
+                                          <p:spTgt spid="17"/>
+                                        </p:tgtEl>
+                                        <p:attrNameLst>
+                                          <p:attrName>style.visibility</p:attrName>
+                                        </p:attrNameLst>
+                                      </p:cBhvr>
+                                      <p:to>
+                                        <p:strVal val="visible"/>
+                                      </p:to>
+                                    </p:set>
+                                  </p:childTnLst>
+                                </p:cTn>
+                              </p:par>
+                              <p:par>
+                                <p:cTn id="27" presetID="1" presetClass="entr" presetSubtype="0" fill="hold" grpId="0" nodeType="withEffect">
+                                  <p:stCondLst>
+                                    <p:cond delay="0"/>
+                                  </p:stCondLst>
+                                  <p:childTnLst>
+                                    <p:set>
+                                      <p:cBhvr>
+                                        <p:cTn id="28" dur="1" fill="hold">
+                                          <p:stCondLst>
+                                            <p:cond delay="0"/>
+                                          </p:stCondLst>
+                                        </p:cTn>
+                                        <p:tgtEl>
+                                          <p:spTgt spid="22"/>
+                                        </p:tgtEl>
+                                        <p:attrNameLst>
+                                          <p:attrName>style.visibility</p:attrName>
+                                        </p:attrNameLst>
+                                      </p:cBhvr>
+                                      <p:to>
+                                        <p:strVal val="visible"/>
+                                      </p:to>
+                                    </p:set>
+                                  </p:childTnLst>
+                                </p:cTn>
+                              </p:par>
+                              <p:par>
+                                <p:cTn id="29" presetID="1" presetClass="entr" presetSubtype="0" fill="hold" nodeType="withEffect">
+                                  <p:stCondLst>
+                                    <p:cond delay="0"/>
+                                  </p:stCondLst>
+                                  <p:childTnLst>
+                                    <p:set>
+                                      <p:cBhvr>
+                                        <p:cTn id="30" dur="1" fill="hold">
+                                          <p:stCondLst>
+                                            <p:cond delay="0"/>
+                                          </p:stCondLst>
+                                        </p:cTn>
+                                        <p:tgtEl>
+                                          <p:spTgt spid="11"/>
+                                        </p:tgtEl>
+                                        <p:attrNameLst>
+                                          <p:attrName>style.visibility</p:attrName>
+                                        </p:attrNameLst>
+                                      </p:cBhvr>
+                                      <p:to>
+                                        <p:strVal val="visible"/>
+                                      </p:to>
+                                    </p:set>
+                                  </p:childTnLst>
+                                </p:cTn>
+                              </p:par>
+                              <p:par>
+                                <p:cTn id="31" presetID="1" presetClass="entr" presetSubtype="0" fill="hold" grpId="0" nodeType="withEffect">
+                                  <p:stCondLst>
+                                    <p:cond delay="0"/>
+                                  </p:stCondLst>
+                                  <p:childTnLst>
+                                    <p:set>
+                                      <p:cBhvr>
+                                        <p:cTn id="32" dur="1" fill="hold">
+                                          <p:stCondLst>
+                                            <p:cond delay="0"/>
+                                          </p:stCondLst>
+                                        </p:cTn>
+                                        <p:tgtEl>
+                                          <p:spTgt spid="7"/>
+                                        </p:tgtEl>
+                                        <p:attrNameLst>
+                                          <p:attrName>style.visibility</p:attrName>
+                                        </p:attrNameLst>
+                                      </p:cBhvr>
+                                      <p:to>
+                                        <p:strVal val="visible"/>
+                                      </p:to>
+                                    </p:set>
+                                  </p:childTnLst>
+                                </p:cTn>
+                              </p:par>
+                            </p:childTnLst>
+                          </p:cTn>
+                        </p:par>
+                      </p:childTnLst>
+                    </p:cTn>
+                  </p:par>
+                </p:childTnLst>
+              </p:cTn>
+              <p:prevCondLst>
+                <p:cond evt="onPrev" delay="0">
+                  <p:tgtEl>
+                    <p:sldTgt/>
+                  </p:tgtEl>
+                </p:cond>
+              </p:prevCondLst>
+              <p:nextCondLst>
+                <p:cond evt="onNext" delay="0">
+                  <p:tgtEl>
+                    <p:sldTgt/>
+                  </p:tgtEl>
+                </p:cond>
+              </p:nextCondLst>
+            </p:seq>
+          </p:childTnLst>
+        </p:cTn>
+      </p:par>
+    </p:tnLst>
+    <p:bldLst>
+      <p:bldP spid="3" grpId="0" animBg="1"/>
+      <p:bldP spid="4" grpId="0" animBg="1"/>
+      <p:bldP spid="22" grpId="0"/>
+      <p:bldP spid="24" grpId="0"/>
+      <p:bldP spid="6" grpId="0"/>
+      <p:bldP spid="7" grpId="0"/>
+      <p:bldP spid="9" grpId="0"/>
+    </p:bldLst>
+  </p:timing>
 </p:sld>
 </file>
 
@@ -12716,7 +13168,7 @@
         </p:blipFill>
         <p:spPr>
           <a:xfrm>
-            <a:off x="4895350" y="2081962"/>
+            <a:off x="4895340" y="2000917"/>
             <a:ext cx="3827285" cy="801000"/>
           </a:xfrm>
           <a:prstGeom prst="rect">
@@ -12871,6 +13323,36 @@
           </a:p>
         </p:txBody>
       </p:sp>
+      <p:pic>
+        <p:nvPicPr>
+          <p:cNvPr id="7" name="Picture 6">
+            <a:extLst>
+              <a:ext uri="{FF2B5EF4-FFF2-40B4-BE49-F238E27FC236}">
+                <a16:creationId xmlns:a16="http://schemas.microsoft.com/office/drawing/2014/main" id="{82B62844-0DFC-390F-6F07-519224B5CA62}"/>
+              </a:ext>
+            </a:extLst>
+          </p:cNvPr>
+          <p:cNvPicPr>
+            <a:picLocks noChangeAspect="1"/>
+          </p:cNvPicPr>
+          <p:nvPr/>
+        </p:nvPicPr>
+        <p:blipFill>
+          <a:blip r:embed="rId5"/>
+          <a:stretch>
+            <a:fillRect/>
+          </a:stretch>
+        </p:blipFill>
+        <p:spPr>
+          <a:xfrm>
+            <a:off x="6802016" y="3027279"/>
+            <a:ext cx="1194707" cy="332547"/>
+          </a:xfrm>
+          <a:prstGeom prst="rect">
+            <a:avLst/>
+          </a:prstGeom>
+        </p:spPr>
+      </p:pic>
     </p:spTree>
     <p:extLst>
       <p:ext uri="{BB962C8B-B14F-4D97-AF65-F5344CB8AC3E}">
@@ -13140,7 +13622,11 @@
           <a:prstGeom prst="rect">
             <a:avLst/>
           </a:prstGeom>
-          <a:noFill/>
+          <a:solidFill>
+            <a:srgbClr val="FF0000">
+              <a:alpha val="71708"/>
+            </a:srgbClr>
+          </a:solidFill>
         </p:spPr>
         <p:txBody>
           <a:bodyPr wrap="square">
@@ -13158,7 +13644,7 @@
             </a:r>
             <a:r>
               <a:rPr lang="en-US" dirty="0"/>
-              <a:t>of light… we need COMSOL.</a:t>
+              <a:t>of light… we need COMSOL!!</a:t>
             </a:r>
           </a:p>
         </p:txBody>
@@ -13222,6 +13708,267 @@
   <p:clrMapOvr>
     <a:masterClrMapping/>
   </p:clrMapOvr>
+  <p:timing>
+    <p:tnLst>
+      <p:par>
+        <p:cTn id="1" dur="indefinite" restart="never" nodeType="tmRoot">
+          <p:childTnLst>
+            <p:seq concurrent="1" nextAc="seek">
+              <p:cTn id="2" dur="indefinite" nodeType="mainSeq">
+                <p:childTnLst>
+                  <p:par>
+                    <p:cTn id="3" fill="hold">
+                      <p:stCondLst>
+                        <p:cond delay="indefinite"/>
+                      </p:stCondLst>
+                      <p:childTnLst>
+                        <p:par>
+                          <p:cTn id="4" fill="hold">
+                            <p:stCondLst>
+                              <p:cond delay="0"/>
+                            </p:stCondLst>
+                            <p:childTnLst>
+                              <p:par>
+                                <p:cTn id="5" presetID="1" presetClass="entr" presetSubtype="0" fill="hold" nodeType="clickEffect">
+                                  <p:stCondLst>
+                                    <p:cond delay="0"/>
+                                  </p:stCondLst>
+                                  <p:childTnLst>
+                                    <p:set>
+                                      <p:cBhvr>
+                                        <p:cTn id="6" dur="1" fill="hold">
+                                          <p:stCondLst>
+                                            <p:cond delay="0"/>
+                                          </p:stCondLst>
+                                        </p:cTn>
+                                        <p:tgtEl>
+                                          <p:spTgt spid="7"/>
+                                        </p:tgtEl>
+                                        <p:attrNameLst>
+                                          <p:attrName>style.visibility</p:attrName>
+                                        </p:attrNameLst>
+                                      </p:cBhvr>
+                                      <p:to>
+                                        <p:strVal val="visible"/>
+                                      </p:to>
+                                    </p:set>
+                                  </p:childTnLst>
+                                </p:cTn>
+                              </p:par>
+                              <p:par>
+                                <p:cTn id="7" presetID="1" presetClass="entr" presetSubtype="0" fill="hold" grpId="0" nodeType="withEffect">
+                                  <p:stCondLst>
+                                    <p:cond delay="0"/>
+                                  </p:stCondLst>
+                                  <p:childTnLst>
+                                    <p:set>
+                                      <p:cBhvr>
+                                        <p:cTn id="8" dur="1" fill="hold">
+                                          <p:stCondLst>
+                                            <p:cond delay="0"/>
+                                          </p:stCondLst>
+                                        </p:cTn>
+                                        <p:tgtEl>
+                                          <p:spTgt spid="3"/>
+                                        </p:tgtEl>
+                                        <p:attrNameLst>
+                                          <p:attrName>style.visibility</p:attrName>
+                                        </p:attrNameLst>
+                                      </p:cBhvr>
+                                      <p:to>
+                                        <p:strVal val="visible"/>
+                                      </p:to>
+                                    </p:set>
+                                  </p:childTnLst>
+                                </p:cTn>
+                              </p:par>
+                              <p:par>
+                                <p:cTn id="9" presetID="1" presetClass="entr" presetSubtype="0" fill="hold" grpId="0" nodeType="withEffect">
+                                  <p:stCondLst>
+                                    <p:cond delay="0"/>
+                                  </p:stCondLst>
+                                  <p:childTnLst>
+                                    <p:set>
+                                      <p:cBhvr>
+                                        <p:cTn id="10" dur="1" fill="hold">
+                                          <p:stCondLst>
+                                            <p:cond delay="0"/>
+                                          </p:stCondLst>
+                                        </p:cTn>
+                                        <p:tgtEl>
+                                          <p:spTgt spid="13"/>
+                                        </p:tgtEl>
+                                        <p:attrNameLst>
+                                          <p:attrName>style.visibility</p:attrName>
+                                        </p:attrNameLst>
+                                      </p:cBhvr>
+                                      <p:to>
+                                        <p:strVal val="visible"/>
+                                      </p:to>
+                                    </p:set>
+                                  </p:childTnLst>
+                                </p:cTn>
+                              </p:par>
+                              <p:par>
+                                <p:cTn id="11" presetID="1" presetClass="entr" presetSubtype="0" fill="hold" grpId="0" nodeType="withEffect">
+                                  <p:stCondLst>
+                                    <p:cond delay="0"/>
+                                  </p:stCondLst>
+                                  <p:childTnLst>
+                                    <p:set>
+                                      <p:cBhvr>
+                                        <p:cTn id="12" dur="1" fill="hold">
+                                          <p:stCondLst>
+                                            <p:cond delay="0"/>
+                                          </p:stCondLst>
+                                        </p:cTn>
+                                        <p:tgtEl>
+                                          <p:spTgt spid="15"/>
+                                        </p:tgtEl>
+                                        <p:attrNameLst>
+                                          <p:attrName>style.visibility</p:attrName>
+                                        </p:attrNameLst>
+                                      </p:cBhvr>
+                                      <p:to>
+                                        <p:strVal val="visible"/>
+                                      </p:to>
+                                    </p:set>
+                                  </p:childTnLst>
+                                </p:cTn>
+                              </p:par>
+                              <p:par>
+                                <p:cTn id="13" presetID="1" presetClass="entr" presetSubtype="0" fill="hold" nodeType="withEffect">
+                                  <p:stCondLst>
+                                    <p:cond delay="0"/>
+                                  </p:stCondLst>
+                                  <p:childTnLst>
+                                    <p:set>
+                                      <p:cBhvr>
+                                        <p:cTn id="14" dur="1" fill="hold">
+                                          <p:stCondLst>
+                                            <p:cond delay="0"/>
+                                          </p:stCondLst>
+                                        </p:cTn>
+                                        <p:tgtEl>
+                                          <p:spTgt spid="18"/>
+                                        </p:tgtEl>
+                                        <p:attrNameLst>
+                                          <p:attrName>style.visibility</p:attrName>
+                                        </p:attrNameLst>
+                                      </p:cBhvr>
+                                      <p:to>
+                                        <p:strVal val="visible"/>
+                                      </p:to>
+                                    </p:set>
+                                  </p:childTnLst>
+                                </p:cTn>
+                              </p:par>
+                              <p:par>
+                                <p:cTn id="15" presetID="1" presetClass="entr" presetSubtype="0" fill="hold" nodeType="withEffect">
+                                  <p:stCondLst>
+                                    <p:cond delay="0"/>
+                                  </p:stCondLst>
+                                  <p:childTnLst>
+                                    <p:set>
+                                      <p:cBhvr>
+                                        <p:cTn id="16" dur="1" fill="hold">
+                                          <p:stCondLst>
+                                            <p:cond delay="0"/>
+                                          </p:stCondLst>
+                                        </p:cTn>
+                                        <p:tgtEl>
+                                          <p:spTgt spid="19"/>
+                                        </p:tgtEl>
+                                        <p:attrNameLst>
+                                          <p:attrName>style.visibility</p:attrName>
+                                        </p:attrNameLst>
+                                      </p:cBhvr>
+                                      <p:to>
+                                        <p:strVal val="visible"/>
+                                      </p:to>
+                                    </p:set>
+                                  </p:childTnLst>
+                                </p:cTn>
+                              </p:par>
+                            </p:childTnLst>
+                          </p:cTn>
+                        </p:par>
+                      </p:childTnLst>
+                    </p:cTn>
+                  </p:par>
+                  <p:par>
+                    <p:cTn id="17" fill="hold">
+                      <p:stCondLst>
+                        <p:cond delay="indefinite"/>
+                      </p:stCondLst>
+                      <p:childTnLst>
+                        <p:par>
+                          <p:cTn id="18" fill="hold">
+                            <p:stCondLst>
+                              <p:cond delay="0"/>
+                            </p:stCondLst>
+                            <p:childTnLst>
+                              <p:par>
+                                <p:cTn id="19" presetID="1" presetClass="entr" presetSubtype="0" fill="hold" grpId="0" nodeType="clickEffect">
+                                  <p:stCondLst>
+                                    <p:cond delay="0"/>
+                                  </p:stCondLst>
+                                  <p:childTnLst>
+                                    <p:set>
+                                      <p:cBhvr>
+                                        <p:cTn id="20" dur="1" fill="hold">
+                                          <p:stCondLst>
+                                            <p:cond delay="0"/>
+                                          </p:stCondLst>
+                                        </p:cTn>
+                                        <p:tgtEl>
+                                          <p:spTgt spid="22"/>
+                                        </p:tgtEl>
+                                        <p:attrNameLst>
+                                          <p:attrName>style.visibility</p:attrName>
+                                        </p:attrNameLst>
+                                      </p:cBhvr>
+                                      <p:to>
+                                        <p:strVal val="visible"/>
+                                      </p:to>
+                                    </p:set>
+                                  </p:childTnLst>
+                                </p:cTn>
+                              </p:par>
+                            </p:childTnLst>
+                          </p:cTn>
+                        </p:par>
+                      </p:childTnLst>
+                    </p:cTn>
+                  </p:par>
+                </p:childTnLst>
+              </p:cTn>
+              <p:prevCondLst>
+                <p:cond evt="onPrev" delay="0">
+                  <p:tgtEl>
+                    <p:sldTgt/>
+                  </p:tgtEl>
+                </p:cond>
+              </p:prevCondLst>
+              <p:nextCondLst>
+                <p:cond evt="onNext" delay="0">
+                  <p:tgtEl>
+                    <p:sldTgt/>
+                  </p:tgtEl>
+                </p:cond>
+              </p:nextCondLst>
+            </p:seq>
+          </p:childTnLst>
+        </p:cTn>
+      </p:par>
+    </p:tnLst>
+    <p:bldLst>
+      <p:bldP spid="13" grpId="0"/>
+      <p:bldP spid="15" grpId="0"/>
+      <p:bldP spid="22" grpId="0" animBg="1"/>
+      <p:bldP spid="3" grpId="0"/>
+    </p:bldLst>
+  </p:timing>
 </p:sld>
 </file>
 
@@ -13294,7 +14041,7 @@
         </p:nvSpPr>
         <p:spPr>
           <a:xfrm>
-            <a:off x="330533" y="1060314"/>
+            <a:off x="330533" y="1534876"/>
             <a:ext cx="1407112" cy="809125"/>
           </a:xfrm>
           <a:prstGeom prst="roundRect">
@@ -13343,7 +14090,7 @@
         </p:nvSpPr>
         <p:spPr>
           <a:xfrm>
-            <a:off x="2434795" y="1033507"/>
+            <a:off x="2434795" y="1508069"/>
             <a:ext cx="1472119" cy="892987"/>
           </a:xfrm>
           <a:prstGeom prst="roundRect">
@@ -13392,7 +14139,7 @@
         </p:nvSpPr>
         <p:spPr>
           <a:xfrm>
-            <a:off x="4604066" y="1060314"/>
+            <a:off x="4604066" y="1534876"/>
             <a:ext cx="1472118" cy="825377"/>
           </a:xfrm>
           <a:prstGeom prst="roundRect">
@@ -13441,7 +14188,7 @@
         </p:nvSpPr>
         <p:spPr>
           <a:xfrm>
-            <a:off x="6692268" y="1060315"/>
+            <a:off x="6692268" y="1534877"/>
             <a:ext cx="1472119" cy="667966"/>
           </a:xfrm>
           <a:prstGeom prst="roundRect">
@@ -13490,7 +14237,7 @@
         </p:nvSpPr>
         <p:spPr>
           <a:xfrm>
-            <a:off x="1617671" y="3176666"/>
+            <a:off x="1617671" y="3651228"/>
             <a:ext cx="1472119" cy="667966"/>
           </a:xfrm>
           <a:prstGeom prst="roundRect">
@@ -13539,7 +14286,7 @@
         </p:nvSpPr>
         <p:spPr>
           <a:xfrm>
-            <a:off x="3855032" y="3176666"/>
+            <a:off x="3855032" y="3651228"/>
             <a:ext cx="1472119" cy="667966"/>
           </a:xfrm>
           <a:prstGeom prst="roundRect">
@@ -13588,7 +14335,7 @@
         </p:nvSpPr>
         <p:spPr>
           <a:xfrm>
-            <a:off x="5956208" y="3176666"/>
+            <a:off x="5956208" y="3651228"/>
             <a:ext cx="1472119" cy="667966"/>
           </a:xfrm>
           <a:prstGeom prst="roundRect">
@@ -13639,7 +14386,7 @@
         </p:nvCxnSpPr>
         <p:spPr>
           <a:xfrm>
-            <a:off x="1737645" y="1433683"/>
+            <a:off x="1737645" y="1954562"/>
             <a:ext cx="697150" cy="15124"/>
           </a:xfrm>
           <a:prstGeom prst="straightConnector1">
@@ -13682,7 +14429,7 @@
         </p:nvCxnSpPr>
         <p:spPr>
           <a:xfrm flipV="1">
-            <a:off x="3906914" y="1473003"/>
+            <a:off x="3906914" y="1947565"/>
             <a:ext cx="697152" cy="6998"/>
           </a:xfrm>
           <a:prstGeom prst="straightConnector1">
@@ -13723,7 +14470,7 @@
         </p:nvCxnSpPr>
         <p:spPr>
           <a:xfrm>
-            <a:off x="6076183" y="1394298"/>
+            <a:off x="6076183" y="1868860"/>
             <a:ext cx="632144" cy="0"/>
           </a:xfrm>
           <a:prstGeom prst="straightConnector1">
@@ -13765,7 +14512,7 @@
         </p:nvCxnSpPr>
         <p:spPr>
           <a:xfrm>
-            <a:off x="3089790" y="3510649"/>
+            <a:off x="3089790" y="3985211"/>
             <a:ext cx="765242" cy="0"/>
           </a:xfrm>
           <a:prstGeom prst="straightConnector1">
@@ -13806,7 +14553,7 @@
         </p:nvCxnSpPr>
         <p:spPr>
           <a:xfrm>
-            <a:off x="5338654" y="3510649"/>
+            <a:off x="5338654" y="3985211"/>
             <a:ext cx="632144" cy="0"/>
           </a:xfrm>
           <a:prstGeom prst="straightConnector1">
@@ -13849,14 +14596,14 @@
         </p:nvCxnSpPr>
         <p:spPr>
           <a:xfrm flipH="1">
-            <a:off x="1617671" y="1394298"/>
+            <a:off x="1617671" y="1868860"/>
             <a:ext cx="6546716" cy="2116351"/>
           </a:xfrm>
           <a:prstGeom prst="bentConnector5">
             <a:avLst>
               <a:gd name="adj1" fmla="val -3492"/>
               <a:gd name="adj2" fmla="val 50000"/>
-              <a:gd name="adj3" fmla="val 103492"/>
+              <a:gd name="adj3" fmla="val 110387"/>
             </a:avLst>
           </a:prstGeom>
           <a:ln w="38100">

</xml_diff>